<commit_message>
updated powerpoint slide deck
</commit_message>
<xml_diff>
--- a/documents/creating-recipes-for-other-chefs.pptx
+++ b/documents/creating-recipes-for-other-chefs.pptx
@@ -18,10 +18,10 @@
   </p:handoutMasterIdLst>
   <p:sldIdLst>
     <p:sldId id="352" r:id="rId12"/>
-    <p:sldId id="359" r:id="rId13"/>
-    <p:sldId id="360" r:id="rId14"/>
-    <p:sldId id="361" r:id="rId15"/>
-    <p:sldId id="362" r:id="rId16"/>
+    <p:sldId id="360" r:id="rId13"/>
+    <p:sldId id="359" r:id="rId14"/>
+    <p:sldId id="362" r:id="rId15"/>
+    <p:sldId id="361" r:id="rId16"/>
     <p:sldId id="363" r:id="rId17"/>
     <p:sldId id="364" r:id="rId18"/>
     <p:sldId id="365" r:id="rId19"/>
@@ -24231,7 +24231,7 @@
         <p:spPr>
           <a:xfrm>
             <a:off x="468630" y="1653540"/>
-            <a:ext cx="8435340" cy="2326344"/>
+            <a:ext cx="8435340" cy="2557177"/>
           </a:xfrm>
         </p:spPr>
         <p:txBody>
@@ -24240,31 +24240,27 @@
           <a:p>
             <a:r>
               <a:rPr lang="en-US" dirty="0"/>
-              <a:t>git add</a:t>
+              <a:t>Commit and push completed recipe to GitHub repo.</a:t>
             </a:r>
           </a:p>
           <a:p>
             <a:r>
               <a:rPr lang="en-US" dirty="0"/>
-              <a:t>git commit -m “finish my first recipe for a chef”</a:t>
+              <a:t>git add git commit -m “finish my first recipe for a chef” git push</a:t>
             </a:r>
           </a:p>
           <a:p>
             <a:r>
               <a:rPr lang="en-US" dirty="0"/>
-              <a:t>git push</a:t>
-            </a:r>
-          </a:p>
-          <a:p>
+              <a:t>After check the GitHub repo to verify the </a:t>
+            </a:r>
+            <a:r>
+              <a:rPr lang="en-US" dirty="0" err="1"/>
+              <a:t>Dockerfile</a:t>
+            </a:r>
             <a:r>
               <a:rPr lang="en-US" dirty="0"/>
-              <a:t>Check GitHub Repo</a:t>
-            </a:r>
-          </a:p>
-          <a:p>
-            <a:r>
-              <a:rPr lang="en-US" dirty="0"/>
-              <a:t>Check </a:t>
+              <a:t> exists. Finally, check </a:t>
             </a:r>
             <a:r>
               <a:rPr lang="en-US" dirty="0" err="1"/>
@@ -24272,7 +24268,7 @@
             </a:r>
             <a:r>
               <a:rPr lang="en-US" dirty="0"/>
-              <a:t> repo</a:t>
+              <a:t> to make sure the build process was triggered.</a:t>
             </a:r>
           </a:p>
         </p:txBody>
@@ -24345,10 +24341,10 @@
       </p:grpSpPr>
       <p:sp>
         <p:nvSpPr>
-          <p:cNvPr id="4" name="Title 3">
+          <p:cNvPr id="2" name="Title 1">
             <a:extLst>
               <a:ext uri="{FF2B5EF4-FFF2-40B4-BE49-F238E27FC236}">
-                <a16:creationId xmlns:a16="http://schemas.microsoft.com/office/drawing/2014/main" id="{626A6D83-00D5-514E-81E3-6FCBA354A028}"/>
+                <a16:creationId xmlns:a16="http://schemas.microsoft.com/office/drawing/2014/main" id="{71A4F3CA-2946-9545-BFE4-AA2004A76A51}"/>
               </a:ext>
             </a:extLst>
           </p:cNvPr>
@@ -24366,25 +24362,17 @@
           <a:p>
             <a:r>
               <a:rPr lang="en-US" dirty="0"/>
-              <a:t>Mise </a:t>
-            </a:r>
-            <a:r>
-              <a:rPr lang="en-US" dirty="0" err="1"/>
-              <a:t>En</a:t>
-            </a:r>
-            <a:r>
-              <a:rPr lang="en-US" dirty="0"/>
-              <a:t> Place</a:t>
-            </a:r>
-          </a:p>
-        </p:txBody>
-      </p:sp>
-      <p:sp>
-        <p:nvSpPr>
-          <p:cNvPr id="5" name="Content Placeholder 4">
+              <a:t>Steps for Today’s Recipe</a:t>
+            </a:r>
+          </a:p>
+        </p:txBody>
+      </p:sp>
+      <p:sp>
+        <p:nvSpPr>
+          <p:cNvPr id="3" name="Content Placeholder 2">
             <a:extLst>
               <a:ext uri="{FF2B5EF4-FFF2-40B4-BE49-F238E27FC236}">
-                <a16:creationId xmlns:a16="http://schemas.microsoft.com/office/drawing/2014/main" id="{A06149D7-9474-ED49-A926-0F83519D5BDA}"/>
+                <a16:creationId xmlns:a16="http://schemas.microsoft.com/office/drawing/2014/main" id="{E2B1393A-D16D-4C4E-A615-DCFB806B384C}"/>
               </a:ext>
             </a:extLst>
           </p:cNvPr>
@@ -24398,85 +24386,133 @@
         <p:spPr>
           <a:xfrm>
             <a:off x="468630" y="1653540"/>
-            <a:ext cx="8435340" cy="3671328"/>
+            <a:ext cx="8435340" cy="3711339"/>
           </a:xfrm>
         </p:spPr>
         <p:txBody>
           <a:bodyPr/>
           <a:lstStyle/>
           <a:p>
+            <a:pPr marL="457200" indent="-457200">
+              <a:buFont typeface="+mj-lt"/>
+              <a:buAutoNum type="arabicPeriod"/>
+            </a:pPr>
+            <a:r>
+              <a:rPr lang="en-US" dirty="0"/>
+              <a:t>Mise </a:t>
+            </a:r>
             <a:r>
               <a:rPr lang="en-US" dirty="0" err="1"/>
-              <a:t>DockerHub</a:t>
+              <a:t>En</a:t>
             </a:r>
             <a:r>
               <a:rPr lang="en-US" dirty="0"/>
-              <a:t> Account </a:t>
-            </a:r>
-            <a:r>
-              <a:rPr lang="en-US" dirty="0">
-                <a:hlinkClick r:id="rId2"/>
-              </a:rPr>
-              <a:t>https://hub.docker.com/signup</a:t>
-            </a:r>
-            <a:endParaRPr lang="en-US" dirty="0"/>
-          </a:p>
-          <a:p>
+              <a:t> Place</a:t>
+            </a:r>
+          </a:p>
+          <a:p>
+            <a:pPr marL="457200" indent="-457200">
+              <a:buFont typeface="+mj-lt"/>
+              <a:buAutoNum type="arabicPeriod"/>
+            </a:pPr>
             <a:r>
               <a:rPr lang="en-US" dirty="0"/>
-              <a:t>Docker installed </a:t>
-            </a:r>
-          </a:p>
-          <a:p>
-            <a:pPr lvl="1"/>
+              <a:t>Set Up Equipment</a:t>
+            </a:r>
+          </a:p>
+          <a:p>
+            <a:pPr marL="457200" indent="-457200">
+              <a:buFont typeface="+mj-lt"/>
+              <a:buAutoNum type="arabicPeriod"/>
+            </a:pPr>
             <a:r>
               <a:rPr lang="en-US" dirty="0"/>
-              <a:t>Mac </a:t>
-            </a:r>
-            <a:r>
-              <a:rPr lang="en-US" dirty="0">
-                <a:hlinkClick r:id="rId3"/>
-              </a:rPr>
-              <a:t>https://hub.docker.com/editions/community/docker-ce-desktop-mac</a:t>
-            </a:r>
-            <a:endParaRPr lang="en-US" dirty="0"/>
-          </a:p>
-          <a:p>
-            <a:pPr lvl="1"/>
+              <a:t>Get Ingredients</a:t>
+            </a:r>
+          </a:p>
+          <a:p>
+            <a:pPr marL="457200" indent="-457200">
+              <a:buFont typeface="+mj-lt"/>
+              <a:buAutoNum type="arabicPeriod"/>
+            </a:pPr>
             <a:r>
               <a:rPr lang="en-US" dirty="0"/>
-              <a:t>Windows </a:t>
-            </a:r>
-            <a:r>
-              <a:rPr lang="en-US" dirty="0">
-                <a:hlinkClick r:id="rId4"/>
-              </a:rPr>
-              <a:t>https://hub.docker.com/editions/community/docker-ce-desktop-windows</a:t>
-            </a:r>
-            <a:endParaRPr lang="en-US" dirty="0"/>
-          </a:p>
-          <a:p>
+              <a:t>Create a Shopping List</a:t>
+            </a:r>
+          </a:p>
+          <a:p>
+            <a:pPr marL="457200" indent="-457200">
+              <a:buFont typeface="+mj-lt"/>
+              <a:buAutoNum type="arabicPeriod"/>
+            </a:pPr>
             <a:r>
               <a:rPr lang="en-US" dirty="0"/>
-              <a:t>GitHub Account </a:t>
-            </a:r>
-            <a:r>
-              <a:rPr lang="en-US" dirty="0">
-                <a:hlinkClick r:id="rId5"/>
-              </a:rPr>
-              <a:t>https://github.com/join?source=header-home</a:t>
-            </a:r>
-            <a:endParaRPr lang="en-US" dirty="0"/>
-          </a:p>
-          <a:p>
+              <a:t>Create Recipe Directions</a:t>
+            </a:r>
+          </a:p>
+          <a:p>
+            <a:pPr marL="457200" indent="-457200">
+              <a:buFont typeface="+mj-lt"/>
+              <a:buAutoNum type="arabicPeriod"/>
+            </a:pPr>
             <a:r>
               <a:rPr lang="en-US" dirty="0"/>
-              <a:t>Link GitHub to </a:t>
-            </a:r>
-            <a:r>
-              <a:rPr lang="en-US" dirty="0" err="1"/>
-              <a:t>DockerHub</a:t>
-            </a:r>
+              <a:t>Make Dish</a:t>
+            </a:r>
+          </a:p>
+          <a:p>
+            <a:pPr marL="457200" indent="-457200">
+              <a:buFont typeface="+mj-lt"/>
+              <a:buAutoNum type="arabicPeriod"/>
+            </a:pPr>
+            <a:r>
+              <a:rPr lang="en-US" dirty="0"/>
+              <a:t>Taste Test</a:t>
+            </a:r>
+          </a:p>
+          <a:p>
+            <a:pPr marL="457200" indent="-457200">
+              <a:buFont typeface="+mj-lt"/>
+              <a:buAutoNum type="arabicPeriod"/>
+            </a:pPr>
+            <a:r>
+              <a:rPr lang="en-US" dirty="0"/>
+              <a:t>Serve to Other Chefs</a:t>
+            </a:r>
+          </a:p>
+        </p:txBody>
+      </p:sp>
+      <p:sp>
+        <p:nvSpPr>
+          <p:cNvPr id="4" name="Slide Number Placeholder 3">
+            <a:extLst>
+              <a:ext uri="{FF2B5EF4-FFF2-40B4-BE49-F238E27FC236}">
+                <a16:creationId xmlns:a16="http://schemas.microsoft.com/office/drawing/2014/main" id="{F615AAEE-4410-374C-ACAA-4399E15C9156}"/>
+              </a:ext>
+            </a:extLst>
+          </p:cNvPr>
+          <p:cNvSpPr>
+            <a:spLocks noGrp="1"/>
+          </p:cNvSpPr>
+          <p:nvPr>
+            <p:ph type="sldNum" sz="quarter" idx="10"/>
+          </p:nvPr>
+        </p:nvSpPr>
+        <p:spPr/>
+        <p:txBody>
+          <a:bodyPr/>
+          <a:lstStyle/>
+          <a:p>
+            <a:pPr>
+              <a:defRPr/>
+            </a:pPr>
+            <a:fld id="{4F730A49-F3B1-408E-9F38-B1EA38C9C26C}" type="slidenum">
+              <a:rPr lang="en-US" smtClean="0"/>
+              <a:pPr>
+                <a:defRPr/>
+              </a:pPr>
+              <a:t>2</a:t>
+            </a:fld>
             <a:endParaRPr lang="en-US" dirty="0"/>
           </a:p>
         </p:txBody>
@@ -24484,7 +24520,7 @@
     </p:spTree>
     <p:extLst>
       <p:ext uri="{BB962C8B-B14F-4D97-AF65-F5344CB8AC3E}">
-        <p14:creationId xmlns:p14="http://schemas.microsoft.com/office/powerpoint/2010/main" val="189191917"/>
+        <p14:creationId xmlns:p14="http://schemas.microsoft.com/office/powerpoint/2010/main" val="3300440736"/>
       </p:ext>
     </p:extLst>
   </p:cSld>
@@ -24514,10 +24550,10 @@
       </p:grpSpPr>
       <p:sp>
         <p:nvSpPr>
-          <p:cNvPr id="2" name="Title 1">
+          <p:cNvPr id="4" name="Title 3">
             <a:extLst>
               <a:ext uri="{FF2B5EF4-FFF2-40B4-BE49-F238E27FC236}">
-                <a16:creationId xmlns:a16="http://schemas.microsoft.com/office/drawing/2014/main" id="{71A4F3CA-2946-9545-BFE4-AA2004A76A51}"/>
+                <a16:creationId xmlns:a16="http://schemas.microsoft.com/office/drawing/2014/main" id="{626A6D83-00D5-514E-81E3-6FCBA354A028}"/>
               </a:ext>
             </a:extLst>
           </p:cNvPr>
@@ -24535,17 +24571,25 @@
           <a:p>
             <a:r>
               <a:rPr lang="en-US" dirty="0"/>
-              <a:t>Steps for Today’s Recipe</a:t>
-            </a:r>
-          </a:p>
-        </p:txBody>
-      </p:sp>
-      <p:sp>
-        <p:nvSpPr>
-          <p:cNvPr id="3" name="Content Placeholder 2">
+              <a:t>Mise </a:t>
+            </a:r>
+            <a:r>
+              <a:rPr lang="en-US" dirty="0" err="1"/>
+              <a:t>En</a:t>
+            </a:r>
+            <a:r>
+              <a:rPr lang="en-US" dirty="0"/>
+              <a:t> Place</a:t>
+            </a:r>
+          </a:p>
+        </p:txBody>
+      </p:sp>
+      <p:sp>
+        <p:nvSpPr>
+          <p:cNvPr id="5" name="Content Placeholder 4">
             <a:extLst>
               <a:ext uri="{FF2B5EF4-FFF2-40B4-BE49-F238E27FC236}">
-                <a16:creationId xmlns:a16="http://schemas.microsoft.com/office/drawing/2014/main" id="{E2B1393A-D16D-4C4E-A615-DCFB806B384C}"/>
+                <a16:creationId xmlns:a16="http://schemas.microsoft.com/office/drawing/2014/main" id="{A06149D7-9474-ED49-A926-0F83519D5BDA}"/>
               </a:ext>
             </a:extLst>
           </p:cNvPr>
@@ -24559,7 +24603,7 @@
         <p:spPr>
           <a:xfrm>
             <a:off x="468630" y="1653540"/>
-            <a:ext cx="8435340" cy="3249674"/>
+            <a:ext cx="8435340" cy="3209663"/>
           </a:xfrm>
         </p:spPr>
         <p:txBody>
@@ -24567,79 +24611,72 @@
           <a:lstStyle/>
           <a:p>
             <a:r>
+              <a:rPr lang="en-US" dirty="0" err="1"/>
+              <a:t>DockerHub</a:t>
+            </a:r>
+            <a:r>
               <a:rPr lang="en-US" dirty="0"/>
-              <a:t>Get Ingredients</a:t>
-            </a:r>
+              <a:t> Account </a:t>
+            </a:r>
+            <a:r>
+              <a:rPr lang="en-US" dirty="0">
+                <a:hlinkClick r:id="rId2"/>
+              </a:rPr>
+              <a:t>https://hub.docker.com/signup</a:t>
+            </a:r>
+            <a:endParaRPr lang="en-US" dirty="0"/>
           </a:p>
           <a:p>
             <a:r>
               <a:rPr lang="en-US" dirty="0"/>
-              <a:t>Set Up Equipment</a:t>
-            </a:r>
-          </a:p>
-          <a:p>
+              <a:t>Docker installed </a:t>
+            </a:r>
+          </a:p>
+          <a:p>
+            <a:pPr lvl="1"/>
             <a:r>
               <a:rPr lang="en-US" dirty="0"/>
-              <a:t>Create a Shopping List</a:t>
-            </a:r>
-          </a:p>
-          <a:p>
+              <a:t>Mac </a:t>
+            </a:r>
+            <a:r>
+              <a:rPr lang="en-US" dirty="0">
+                <a:hlinkClick r:id="rId3"/>
+              </a:rPr>
+              <a:t>https://hub.docker.com/editions/community/docker-ce-desktop-mac</a:t>
+            </a:r>
+            <a:endParaRPr lang="en-US" dirty="0"/>
+          </a:p>
+          <a:p>
+            <a:pPr lvl="1"/>
             <a:r>
               <a:rPr lang="en-US" dirty="0"/>
-              <a:t>Create Recipe Directions</a:t>
-            </a:r>
+              <a:t>Windows </a:t>
+            </a:r>
+            <a:r>
+              <a:rPr lang="en-US" dirty="0">
+                <a:hlinkClick r:id="rId4"/>
+              </a:rPr>
+              <a:t>https://hub.docker.com/editions/community/docker-ce-desktop-windows</a:t>
+            </a:r>
+            <a:endParaRPr lang="en-US" dirty="0"/>
           </a:p>
           <a:p>
             <a:r>
               <a:rPr lang="en-US" dirty="0"/>
-              <a:t>Make Dish</a:t>
-            </a:r>
-          </a:p>
-          <a:p>
-            <a:r>
-              <a:rPr lang="en-US" dirty="0"/>
-              <a:t>Taste Test</a:t>
-            </a:r>
-          </a:p>
-          <a:p>
-            <a:r>
-              <a:rPr lang="en-US" dirty="0"/>
-              <a:t>Serve to Other Chefs</a:t>
-            </a:r>
-          </a:p>
-        </p:txBody>
-      </p:sp>
-      <p:sp>
-        <p:nvSpPr>
-          <p:cNvPr id="4" name="Slide Number Placeholder 3">
-            <a:extLst>
-              <a:ext uri="{FF2B5EF4-FFF2-40B4-BE49-F238E27FC236}">
-                <a16:creationId xmlns:a16="http://schemas.microsoft.com/office/drawing/2014/main" id="{F615AAEE-4410-374C-ACAA-4399E15C9156}"/>
-              </a:ext>
-            </a:extLst>
-          </p:cNvPr>
-          <p:cNvSpPr>
-            <a:spLocks noGrp="1"/>
-          </p:cNvSpPr>
-          <p:nvPr>
-            <p:ph type="sldNum" sz="quarter" idx="10"/>
-          </p:nvPr>
-        </p:nvSpPr>
-        <p:spPr/>
-        <p:txBody>
-          <a:bodyPr/>
-          <a:lstStyle/>
-          <a:p>
-            <a:pPr>
-              <a:defRPr/>
-            </a:pPr>
-            <a:fld id="{4F730A49-F3B1-408E-9F38-B1EA38C9C26C}" type="slidenum">
-              <a:rPr lang="en-US" smtClean="0"/>
-              <a:pPr>
-                <a:defRPr/>
-              </a:pPr>
-              <a:t>3</a:t>
-            </a:fld>
+              <a:t>GitHub Account </a:t>
+            </a:r>
+            <a:r>
+              <a:rPr lang="en-US" dirty="0">
+                <a:hlinkClick r:id="rId5"/>
+              </a:rPr>
+              <a:t>https://github.com/join?source=header-hom</a:t>
+            </a:r>
+            <a:r>
+              <a:rPr lang="en-US" dirty="0">
+                <a:hlinkClick r:id="rId5"/>
+              </a:rPr>
+              <a:t>e</a:t>
+            </a:r>
             <a:endParaRPr lang="en-US" dirty="0"/>
           </a:p>
         </p:txBody>
@@ -24647,7 +24684,7 @@
     </p:spTree>
     <p:extLst>
       <p:ext uri="{BB962C8B-B14F-4D97-AF65-F5344CB8AC3E}">
-        <p14:creationId xmlns:p14="http://schemas.microsoft.com/office/powerpoint/2010/main" val="3300440736"/>
+        <p14:creationId xmlns:p14="http://schemas.microsoft.com/office/powerpoint/2010/main" val="189191917"/>
       </p:ext>
     </p:extLst>
   </p:cSld>
@@ -24680,7 +24717,7 @@
           <p:cNvPr id="2" name="Title 1">
             <a:extLst>
               <a:ext uri="{FF2B5EF4-FFF2-40B4-BE49-F238E27FC236}">
-                <a16:creationId xmlns:a16="http://schemas.microsoft.com/office/drawing/2014/main" id="{17EE01FA-18E1-B941-B93F-295E927929F9}"/>
+                <a16:creationId xmlns:a16="http://schemas.microsoft.com/office/drawing/2014/main" id="{DC2A9F04-EC91-4545-A86E-66EB598E5A55}"/>
               </a:ext>
             </a:extLst>
           </p:cNvPr>
@@ -24698,7 +24735,7 @@
           <a:p>
             <a:r>
               <a:rPr lang="en-US" dirty="0"/>
-              <a:t>Get Ingredients</a:t>
+              <a:t>Set Up Equipment</a:t>
             </a:r>
           </a:p>
         </p:txBody>
@@ -24708,7 +24745,7 @@
           <p:cNvPr id="3" name="Content Placeholder 2">
             <a:extLst>
               <a:ext uri="{FF2B5EF4-FFF2-40B4-BE49-F238E27FC236}">
-                <a16:creationId xmlns:a16="http://schemas.microsoft.com/office/drawing/2014/main" id="{37DE7A38-3D6E-8A4E-B1DC-E175C55294BD}"/>
+                <a16:creationId xmlns:a16="http://schemas.microsoft.com/office/drawing/2014/main" id="{BEE51976-B18C-704E-A860-635DC47439AA}"/>
               </a:ext>
             </a:extLst>
           </p:cNvPr>
@@ -24722,7 +24759,7 @@
         <p:spPr>
           <a:xfrm>
             <a:off x="468630" y="1653540"/>
-            <a:ext cx="8435340" cy="2249400"/>
+            <a:ext cx="8435340" cy="1326071"/>
           </a:xfrm>
         </p:spPr>
         <p:txBody>
@@ -24731,7 +24768,7 @@
           <a:p>
             <a:r>
               <a:rPr lang="en-US" dirty="0"/>
-              <a:t>Clone repo </a:t>
+              <a:t>Fork repo </a:t>
             </a:r>
             <a:r>
               <a:rPr lang="en-US" dirty="0">
@@ -24739,25 +24776,21 @@
               </a:rPr>
               <a:t>https://github.com/bryan-nice/creating-recipes-for-other-chefs.git</a:t>
             </a:r>
+            <a:endParaRPr lang="en-US" dirty="0"/>
+          </a:p>
+          <a:p>
             <a:r>
               <a:rPr lang="en-US" dirty="0"/>
-              <a:t> </a:t>
-            </a:r>
-          </a:p>
-          <a:p>
+              <a:t>Create </a:t>
+            </a:r>
+            <a:r>
+              <a:rPr lang="en-US" dirty="0" err="1"/>
+              <a:t>DockerHub</a:t>
+            </a:r>
             <a:r>
               <a:rPr lang="en-US" dirty="0"/>
-              <a:t>R example</a:t>
-            </a:r>
-          </a:p>
-          <a:p>
-            <a:r>
-              <a:rPr lang="en-US" dirty="0"/>
-              <a:t>Python example</a:t>
-            </a:r>
-          </a:p>
-          <a:p>
-            <a:endParaRPr lang="en-US" dirty="0"/>
+              <a:t> Repo and Link forked GitHub Repo to it</a:t>
+            </a:r>
           </a:p>
         </p:txBody>
       </p:sp>
@@ -24766,7 +24799,7 @@
           <p:cNvPr id="4" name="Slide Number Placeholder 3">
             <a:extLst>
               <a:ext uri="{FF2B5EF4-FFF2-40B4-BE49-F238E27FC236}">
-                <a16:creationId xmlns:a16="http://schemas.microsoft.com/office/drawing/2014/main" id="{76BC11E4-CD0C-4149-BEC2-AD4F09AFE39D}"/>
+                <a16:creationId xmlns:a16="http://schemas.microsoft.com/office/drawing/2014/main" id="{865F1B62-05F4-0541-8420-2312856891C2}"/>
               </a:ext>
             </a:extLst>
           </p:cNvPr>
@@ -24799,7 +24832,7 @@
     </p:spTree>
     <p:extLst>
       <p:ext uri="{BB962C8B-B14F-4D97-AF65-F5344CB8AC3E}">
-        <p14:creationId xmlns:p14="http://schemas.microsoft.com/office/powerpoint/2010/main" val="3566238939"/>
+        <p14:creationId xmlns:p14="http://schemas.microsoft.com/office/powerpoint/2010/main" val="299083437"/>
       </p:ext>
     </p:extLst>
   </p:cSld>
@@ -24832,7 +24865,7 @@
           <p:cNvPr id="2" name="Title 1">
             <a:extLst>
               <a:ext uri="{FF2B5EF4-FFF2-40B4-BE49-F238E27FC236}">
-                <a16:creationId xmlns:a16="http://schemas.microsoft.com/office/drawing/2014/main" id="{DC2A9F04-EC91-4545-A86E-66EB598E5A55}"/>
+                <a16:creationId xmlns:a16="http://schemas.microsoft.com/office/drawing/2014/main" id="{17EE01FA-18E1-B941-B93F-295E927929F9}"/>
               </a:ext>
             </a:extLst>
           </p:cNvPr>
@@ -24850,7 +24883,7 @@
           <a:p>
             <a:r>
               <a:rPr lang="en-US" dirty="0"/>
-              <a:t>Set Up Equipment</a:t>
+              <a:t>Get Ingredients</a:t>
             </a:r>
           </a:p>
         </p:txBody>
@@ -24860,7 +24893,7 @@
           <p:cNvPr id="3" name="Content Placeholder 2">
             <a:extLst>
               <a:ext uri="{FF2B5EF4-FFF2-40B4-BE49-F238E27FC236}">
-                <a16:creationId xmlns:a16="http://schemas.microsoft.com/office/drawing/2014/main" id="{BEE51976-B18C-704E-A860-635DC47439AA}"/>
+                <a16:creationId xmlns:a16="http://schemas.microsoft.com/office/drawing/2014/main" id="{37DE7A38-3D6E-8A4E-B1DC-E175C55294BD}"/>
               </a:ext>
             </a:extLst>
           </p:cNvPr>
@@ -24874,7 +24907,7 @@
         <p:spPr>
           <a:xfrm>
             <a:off x="468630" y="1653540"/>
-            <a:ext cx="8435340" cy="1864680"/>
+            <a:ext cx="8435340" cy="1326071"/>
           </a:xfrm>
         </p:spPr>
         <p:txBody>
@@ -24883,33 +24916,23 @@
           <a:p>
             <a:r>
               <a:rPr lang="en-US" dirty="0"/>
-              <a:t>Create GitHub Repo</a:t>
+              <a:t>Clone repo forked repo</a:t>
             </a:r>
           </a:p>
           <a:p>
             <a:r>
               <a:rPr lang="en-US" dirty="0"/>
-              <a:t>Create </a:t>
-            </a:r>
-            <a:r>
-              <a:rPr lang="en-US" dirty="0" err="1"/>
-              <a:t>DockerHub</a:t>
+              <a:t>git clone </a:t>
+            </a:r>
+            <a:r>
+              <a:rPr lang="en-US" dirty="0">
+                <a:hlinkClick r:id="rId2"/>
+              </a:rPr>
+              <a:t>https://github.com/bryan-nice/creating-recipes-for-other-chefs.git</a:t>
             </a:r>
             <a:r>
               <a:rPr lang="en-US" dirty="0"/>
-              <a:t> Repo and Link GitHub Repo to it</a:t>
-            </a:r>
-          </a:p>
-          <a:p>
-            <a:r>
-              <a:rPr lang="en-US" dirty="0"/>
-              <a:t>Clone GitHub Repo</a:t>
-            </a:r>
-          </a:p>
-          <a:p>
-            <a:r>
-              <a:rPr lang="en-US" dirty="0"/>
-              <a:t>Set up folder organization for repo</a:t>
+              <a:t> </a:t>
             </a:r>
           </a:p>
         </p:txBody>
@@ -24919,7 +24942,7 @@
           <p:cNvPr id="4" name="Slide Number Placeholder 3">
             <a:extLst>
               <a:ext uri="{FF2B5EF4-FFF2-40B4-BE49-F238E27FC236}">
-                <a16:creationId xmlns:a16="http://schemas.microsoft.com/office/drawing/2014/main" id="{865F1B62-05F4-0541-8420-2312856891C2}"/>
+                <a16:creationId xmlns:a16="http://schemas.microsoft.com/office/drawing/2014/main" id="{76BC11E4-CD0C-4149-BEC2-AD4F09AFE39D}"/>
               </a:ext>
             </a:extLst>
           </p:cNvPr>
@@ -24952,7 +24975,7 @@
     </p:spTree>
     <p:extLst>
       <p:ext uri="{BB962C8B-B14F-4D97-AF65-F5344CB8AC3E}">
-        <p14:creationId xmlns:p14="http://schemas.microsoft.com/office/powerpoint/2010/main" val="299083437"/>
+        <p14:creationId xmlns:p14="http://schemas.microsoft.com/office/powerpoint/2010/main" val="3566238939"/>
       </p:ext>
     </p:extLst>
   </p:cSld>
@@ -25027,7 +25050,7 @@
         <p:spPr>
           <a:xfrm>
             <a:off x="468630" y="1653540"/>
-            <a:ext cx="8435340" cy="1643081"/>
+            <a:ext cx="8435340" cy="3403562"/>
           </a:xfrm>
         </p:spPr>
         <p:txBody>
@@ -25036,28 +25059,48 @@
           <a:p>
             <a:r>
               <a:rPr lang="en-US" dirty="0"/>
-              <a:t>Open Model Code</a:t>
-            </a:r>
-          </a:p>
-          <a:p>
-            <a:pPr lvl="1"/>
+              <a:t>Open the file </a:t>
+            </a:r>
+            <a:r>
+              <a:rPr lang="en-US" dirty="0">
+                <a:hlinkClick r:id="rId2"/>
+              </a:rPr>
+              <a:t>nedocsRandomForestForecast.R</a:t>
+            </a:r>
+            <a:endParaRPr lang="en-US" dirty="0"/>
+          </a:p>
+          <a:p>
             <a:r>
               <a:rPr lang="en-US" dirty="0"/>
-              <a:t>Identify Libraries</a:t>
-            </a:r>
-          </a:p>
-          <a:p>
-            <a:pPr lvl="1"/>
+              <a:t>At the top of the file add #!/</a:t>
+            </a:r>
+            <a:r>
+              <a:rPr lang="en-US" dirty="0" err="1"/>
+              <a:t>usr</a:t>
+            </a:r>
             <a:r>
               <a:rPr lang="en-US" dirty="0"/>
-              <a:t>How data is inputted</a:t>
-            </a:r>
-          </a:p>
-          <a:p>
-            <a:pPr lvl="1"/>
+              <a:t>/bin/env </a:t>
+            </a:r>
+            <a:r>
+              <a:rPr lang="en-US" dirty="0" err="1"/>
+              <a:t>Rscript</a:t>
+            </a:r>
             <a:r>
               <a:rPr lang="en-US" dirty="0"/>
-              <a:t>How data is outputted</a:t>
+              <a:t>. This will enable the bash interpreter to use the correct kernel so it can be executed like an app.</a:t>
+            </a:r>
+          </a:p>
+          <a:p>
+            <a:r>
+              <a:rPr lang="en-US" dirty="0"/>
+              <a:t>Look for the line where the variable packages exists and take note of the packages required for this model to function.</a:t>
+            </a:r>
+          </a:p>
+          <a:p>
+            <a:r>
+              <a:rPr lang="en-US" dirty="0"/>
+              <a:t>Let's inspect the R file to understand how data is following in and out of the model process.</a:t>
             </a:r>
           </a:p>
         </p:txBody>
@@ -25175,7 +25218,7 @@
         <p:spPr>
           <a:xfrm>
             <a:off x="468630" y="1653540"/>
-            <a:ext cx="8435340" cy="941350"/>
+            <a:ext cx="8435340" cy="2172456"/>
           </a:xfrm>
         </p:spPr>
         <p:txBody>
@@ -25184,18 +25227,55 @@
           <a:p>
             <a:r>
               <a:rPr lang="en-US" dirty="0"/>
-              <a:t>Create a </a:t>
+              <a:t>Open </a:t>
             </a:r>
             <a:r>
               <a:rPr lang="en-US" dirty="0" err="1"/>
-              <a:t>DockerFile</a:t>
-            </a:r>
-            <a:endParaRPr lang="en-US" dirty="0"/>
-          </a:p>
-          <a:p>
+              <a:t>Dockerfile</a:t>
+            </a:r>
+            <a:r>
+              <a:rPr lang="en-US" dirty="0"/>
+              <a:t> and add the list of required </a:t>
+            </a:r>
             <a:r>
               <a:rPr lang="en-US" dirty="0" err="1"/>
-              <a:t>Makefile</a:t>
+              <a:t>pacakages</a:t>
+            </a:r>
+            <a:r>
+              <a:rPr lang="en-US" dirty="0"/>
+              <a:t> to the line with ENV R_PACKAGE. (Should look like ENV R_PACKAGE "'</a:t>
+            </a:r>
+            <a:r>
+              <a:rPr lang="en-US" dirty="0" err="1"/>
+              <a:t>a','b','c</a:t>
+            </a:r>
+            <a:r>
+              <a:rPr lang="en-US" dirty="0"/>
+              <a:t>'")</a:t>
+            </a:r>
+          </a:p>
+          <a:p>
+            <a:r>
+              <a:rPr lang="en-US" dirty="0"/>
+              <a:t>Let's inspect the </a:t>
+            </a:r>
+            <a:r>
+              <a:rPr lang="en-US" dirty="0" err="1"/>
+              <a:t>Dockerfile</a:t>
+            </a:r>
+            <a:r>
+              <a:rPr lang="en-US" dirty="0"/>
+              <a:t> to understand the instructions.</a:t>
+            </a:r>
+          </a:p>
+          <a:p>
+            <a:r>
+              <a:rPr lang="en-US" dirty="0"/>
+              <a:t>Save and close </a:t>
+            </a:r>
+            <a:r>
+              <a:rPr lang="en-US" dirty="0" err="1"/>
+              <a:t>Dockerfile</a:t>
             </a:r>
             <a:endParaRPr lang="en-US" dirty="0"/>
           </a:p>
@@ -25314,16 +25394,19 @@
         <p:spPr>
           <a:xfrm>
             <a:off x="468630" y="1653540"/>
-            <a:ext cx="8435340" cy="479685"/>
+            <a:ext cx="8435340" cy="941350"/>
           </a:xfrm>
         </p:spPr>
         <p:txBody>
           <a:bodyPr/>
           <a:lstStyle/>
           <a:p>
-            <a:pPr marL="0" indent="0">
-              <a:buNone/>
-            </a:pPr>
+            <a:r>
+              <a:rPr lang="en-US" dirty="0"/>
+              <a:t>Execute docker build command to create the image locally.</a:t>
+            </a:r>
+          </a:p>
+          <a:p>
             <a:r>
               <a:rPr lang="en-US" dirty="0"/>
               <a:t>docker build --tag </a:t>
@@ -25333,10 +25416,9 @@
               <a:t>nedocs</a:t>
             </a:r>
             <a:r>
-              <a:rPr lang="en-US"/>
+              <a:rPr lang="en-US" dirty="0"/>
               <a:t> .</a:t>
             </a:r>
-            <a:endParaRPr lang="en-US" dirty="0"/>
           </a:p>
         </p:txBody>
       </p:sp>
@@ -25453,7 +25535,7 @@
         <p:spPr>
           <a:xfrm>
             <a:off x="468630" y="1653540"/>
-            <a:ext cx="8435340" cy="1403015"/>
+            <a:ext cx="8435340" cy="2480233"/>
           </a:xfrm>
         </p:spPr>
         <p:txBody>
@@ -25462,36 +25544,43 @@
           <a:p>
             <a:r>
               <a:rPr lang="en-US" dirty="0"/>
-              <a:t>docker run -it --rm -v ${PWD}:/</a:t>
+              <a:t>Test the container with the example data set to verify everything works correctly.</a:t>
+            </a:r>
+          </a:p>
+          <a:p>
+            <a:r>
+              <a:rPr lang="en-US" dirty="0"/>
+              <a:t>docker run --rm -it -v ${PWD}/examples:/examples </a:t>
             </a:r>
             <a:r>
               <a:rPr lang="en-US" dirty="0" err="1"/>
-              <a:t>prep_table</a:t>
+              <a:t>nedocs</a:t>
             </a:r>
             <a:r>
               <a:rPr lang="en-US" dirty="0"/>
-              <a:t> </a:t>
+              <a:t> --r-script /r-files/</a:t>
             </a:r>
             <a:r>
               <a:rPr lang="en-US" dirty="0" err="1"/>
-              <a:t>my_recipe</a:t>
+              <a:t>nedocsRandomForestForecast.R</a:t>
+            </a:r>
+            <a:r>
+              <a:rPr lang="en-US" dirty="0"/>
+              <a:t>  --input-data-file /examples/</a:t>
+            </a:r>
+            <a:r>
+              <a:rPr lang="en-US" dirty="0" err="1"/>
+              <a:t>nedocs_dataset.csv</a:t>
+            </a:r>
+            <a:r>
+              <a:rPr lang="en-US" dirty="0"/>
+              <a:t> --output-data-file /examples/</a:t>
+            </a:r>
+            <a:r>
+              <a:rPr lang="en-US" dirty="0" err="1"/>
+              <a:t>nedocs_output.csv</a:t>
             </a:r>
             <a:endParaRPr lang="en-US" dirty="0"/>
-          </a:p>
-          <a:p>
-            <a:r>
-              <a:rPr lang="en-US" dirty="0">
-                <a:hlinkClick r:id="rId2"/>
-              </a:rPr>
-              <a:t>http://localhost:8888/lab</a:t>
-            </a:r>
-            <a:endParaRPr lang="en-US" dirty="0"/>
-          </a:p>
-          <a:p>
-            <a:r>
-              <a:rPr lang="en-US" dirty="0"/>
-              <a:t>Check results</a:t>
-            </a:r>
           </a:p>
         </p:txBody>
       </p:sp>
@@ -28970,15 +29059,6 @@
 
 <file path=customXml/item1.xml><?xml version="1.0" encoding="utf-8"?>
 <?mso-contentType ?>
-<FormTemplates xmlns="http://schemas.microsoft.com/sharepoint/v3/contenttype/forms">
-  <Display>DocumentLibraryForm</Display>
-  <Edit>DocumentLibraryForm</Edit>
-  <New>DocumentLibraryForm</New>
-</FormTemplates>
-</file>
-
-<file path=customXml/item2.xml><?xml version="1.0" encoding="utf-8"?>
-<?mso-contentType ?>
 <spe:Receivers xmlns:spe="http://schemas.microsoft.com/sharepoint/events">
   <Receiver>
     <Name>Document ID Generator</Name>
@@ -29023,7 +29103,28 @@
 </spe:Receivers>
 </file>
 
+<file path=customXml/item2.xml><?xml version="1.0" encoding="utf-8"?>
+<?mso-contentType ?>
+<FormTemplates xmlns="http://schemas.microsoft.com/sharepoint/v3/contenttype/forms">
+  <Display>DocumentLibraryForm</Display>
+  <Edit>DocumentLibraryForm</Edit>
+  <New>DocumentLibraryForm</New>
+</FormTemplates>
+</file>
+
 <file path=customXml/item3.xml><?xml version="1.0" encoding="utf-8"?>
+<p:properties xmlns:p="http://schemas.microsoft.com/office/2006/metadata/properties" xmlns:xsi="http://www.w3.org/2001/XMLSchema-instance" xmlns:pc="http://schemas.microsoft.com/office/infopath/2007/PartnerControls">
+  <documentManagement>
+    <_dlc_DocId xmlns="4044c79b-e694-476e-bc8f-83d691b5edfc">6ZDQ4F6RC6KQ-1133-88</_dlc_DocId>
+    <_dlc_DocIdUrl xmlns="4044c79b-e694-476e-bc8f-83d691b5edfc">
+      <Url>http://sps/IS/IA/KM/_layouts/DocIdRedir.aspx?ID=6ZDQ4F6RC6KQ-1133-88</Url>
+      <Description>6ZDQ4F6RC6KQ-1133-88</Description>
+    </_dlc_DocIdUrl>
+  </documentManagement>
+</p:properties>
+</file>
+
+<file path=customXml/item4.xml><?xml version="1.0" encoding="utf-8"?>
 <ct:contentTypeSchema xmlns:ct="http://schemas.microsoft.com/office/2006/metadata/contentType" xmlns:ma="http://schemas.microsoft.com/office/2006/metadata/properties/metaAttributes" ct:_="" ma:_="" ma:contentTypeName="Document" ma:contentTypeID="0x010100EA9E4856CA32DB4D98114E0936DEA20E" ma:contentTypeVersion="0" ma:contentTypeDescription="Create a new document." ma:contentTypeScope="" ma:versionID="ae0e89aa8bed1828c86e4e4153ba6198">
   <xsd:schema xmlns:xsd="http://www.w3.org/2001/XMLSchema" xmlns:xs="http://www.w3.org/2001/XMLSchema" xmlns:p="http://schemas.microsoft.com/office/2006/metadata/properties" xmlns:ns2="4044c79b-e694-476e-bc8f-83d691b5edfc" targetNamespace="http://schemas.microsoft.com/office/2006/metadata/properties" ma:root="true" ma:fieldsID="86b8897b8d8818626be343d77a926170" ns2:_="">
     <xsd:import namespace="4044c79b-e694-476e-bc8f-83d691b5edfc"/>
@@ -29168,19 +29269,15 @@
 </ct:contentTypeSchema>
 </file>
 
-<file path=customXml/item4.xml><?xml version="1.0" encoding="utf-8"?>
-<p:properties xmlns:p="http://schemas.microsoft.com/office/2006/metadata/properties" xmlns:xsi="http://www.w3.org/2001/XMLSchema-instance" xmlns:pc="http://schemas.microsoft.com/office/infopath/2007/PartnerControls">
-  <documentManagement>
-    <_dlc_DocId xmlns="4044c79b-e694-476e-bc8f-83d691b5edfc">6ZDQ4F6RC6KQ-1133-88</_dlc_DocId>
-    <_dlc_DocIdUrl xmlns="4044c79b-e694-476e-bc8f-83d691b5edfc">
-      <Url>http://sps/IS/IA/KM/_layouts/DocIdRedir.aspx?ID=6ZDQ4F6RC6KQ-1133-88</Url>
-      <Description>6ZDQ4F6RC6KQ-1133-88</Description>
-    </_dlc_DocIdUrl>
-  </documentManagement>
-</p:properties>
+<file path=customXml/itemProps1.xml><?xml version="1.0" encoding="utf-8"?>
+<ds:datastoreItem xmlns:ds="http://schemas.openxmlformats.org/officeDocument/2006/customXml" ds:itemID="{1AAB9E06-789A-4FCF-82CD-1E6BB1E6EC40}">
+  <ds:schemaRefs>
+    <ds:schemaRef ds:uri="http://schemas.microsoft.com/sharepoint/events"/>
+  </ds:schemaRefs>
+</ds:datastoreItem>
 </file>
 
-<file path=customXml/itemProps1.xml><?xml version="1.0" encoding="utf-8"?>
+<file path=customXml/itemProps2.xml><?xml version="1.0" encoding="utf-8"?>
 <ds:datastoreItem xmlns:ds="http://schemas.openxmlformats.org/officeDocument/2006/customXml" ds:itemID="{71033D61-2328-4033-AD4E-D4FDFC42BC48}">
   <ds:schemaRefs>
     <ds:schemaRef ds:uri="http://schemas.microsoft.com/sharepoint/v3/contenttype/forms"/>
@@ -29188,15 +29285,23 @@
 </ds:datastoreItem>
 </file>
 
-<file path=customXml/itemProps2.xml><?xml version="1.0" encoding="utf-8"?>
-<ds:datastoreItem xmlns:ds="http://schemas.openxmlformats.org/officeDocument/2006/customXml" ds:itemID="{1AAB9E06-789A-4FCF-82CD-1E6BB1E6EC40}">
+<file path=customXml/itemProps3.xml><?xml version="1.0" encoding="utf-8"?>
+<ds:datastoreItem xmlns:ds="http://schemas.openxmlformats.org/officeDocument/2006/customXml" ds:itemID="{8CBEAE13-0AC4-4223-948B-8AE62C54F2D3}">
   <ds:schemaRefs>
-    <ds:schemaRef ds:uri="http://schemas.microsoft.com/sharepoint/events"/>
+    <ds:schemaRef ds:uri="http://schemas.microsoft.com/office/2006/metadata/properties"/>
+    <ds:schemaRef ds:uri="http://schemas.microsoft.com/office/infopath/2007/PartnerControls"/>
+    <ds:schemaRef ds:uri="http://purl.org/dc/dcmitype/"/>
+    <ds:schemaRef ds:uri="http://purl.org/dc/elements/1.1/"/>
+    <ds:schemaRef ds:uri="http://schemas.microsoft.com/office/2006/documentManagement/types"/>
+    <ds:schemaRef ds:uri="4044c79b-e694-476e-bc8f-83d691b5edfc"/>
+    <ds:schemaRef ds:uri="http://schemas.openxmlformats.org/package/2006/metadata/core-properties"/>
+    <ds:schemaRef ds:uri="http://www.w3.org/XML/1998/namespace"/>
+    <ds:schemaRef ds:uri="http://purl.org/dc/terms/"/>
   </ds:schemaRefs>
 </ds:datastoreItem>
 </file>
 
-<file path=customXml/itemProps3.xml><?xml version="1.0" encoding="utf-8"?>
+<file path=customXml/itemProps4.xml><?xml version="1.0" encoding="utf-8"?>
 <ds:datastoreItem xmlns:ds="http://schemas.openxmlformats.org/officeDocument/2006/customXml" ds:itemID="{301FECA9-B940-4DB9-B633-3C57D7BB466F}">
   <ds:schemaRefs>
     <ds:schemaRef ds:uri="http://schemas.microsoft.com/office/2006/metadata/contentType"/>
@@ -29212,20 +29317,4 @@
     <ds:schemaRef ds:uri="http://schemas.microsoft.com/internal/obd"/>
   </ds:schemaRefs>
 </ds:datastoreItem>
-</file>
-
-<file path=customXml/itemProps4.xml><?xml version="1.0" encoding="utf-8"?>
-<ds:datastoreItem xmlns:ds="http://schemas.openxmlformats.org/officeDocument/2006/customXml" ds:itemID="{8CBEAE13-0AC4-4223-948B-8AE62C54F2D3}">
-  <ds:schemaRefs>
-    <ds:schemaRef ds:uri="http://schemas.microsoft.com/office/2006/metadata/properties"/>
-    <ds:schemaRef ds:uri="http://schemas.microsoft.com/office/infopath/2007/PartnerControls"/>
-    <ds:schemaRef ds:uri="http://purl.org/dc/dcmitype/"/>
-    <ds:schemaRef ds:uri="http://purl.org/dc/elements/1.1/"/>
-    <ds:schemaRef ds:uri="http://schemas.microsoft.com/office/2006/documentManagement/types"/>
-    <ds:schemaRef ds:uri="4044c79b-e694-476e-bc8f-83d691b5edfc"/>
-    <ds:schemaRef ds:uri="http://schemas.openxmlformats.org/package/2006/metadata/core-properties"/>
-    <ds:schemaRef ds:uri="http://www.w3.org/XML/1998/namespace"/>
-    <ds:schemaRef ds:uri="http://purl.org/dc/terms/"/>
-  </ds:schemaRefs>
-</ds:datastoreItem>
 </file>
</xml_diff>